<commit_message>
Add CW/CCW introduction and fuction
</commit_message>
<xml_diff>
--- a/R2000 DET 区域划分使用说明.pptx
+++ b/R2000 DET 区域划分使用说明.pptx
@@ -279,7 +279,7 @@
           <a:p>
             <a:fld id="{5428A22D-4BDC-45F8-88E2-6B7D3585B9EE}" type="datetimeFigureOut">
               <a:rPr lang="de-DE" smtClean="0"/>
-              <a:t>06.04.2020</a:t>
+              <a:t>09.04.2020</a:t>
             </a:fld>
             <a:endParaRPr lang="de-DE" dirty="0"/>
           </a:p>
@@ -445,7 +445,7 @@
             <a:fld id="{133F64E5-F2C9-4EC3-A727-49129F5ECE03}" type="datetimeFigureOut">
               <a:rPr lang="de-DE" smtClean="0"/>
               <a:pPr/>
-              <a:t>06.04.2020</a:t>
+              <a:t>09.04.2020</a:t>
             </a:fld>
             <a:endParaRPr lang="de-DE" dirty="0"/>
           </a:p>
@@ -1623,7 +1623,7 @@
           <a:p>
             <a:fld id="{A9F8731D-324F-44E3-A6DD-67C112F6A9E8}" type="datetime1">
               <a:rPr lang="en-US" smtClean="0"/>
-              <a:t>4/6/2020</a:t>
+              <a:t>4/9/2020</a:t>
             </a:fld>
             <a:endParaRPr lang="de-DE" dirty="0"/>
           </a:p>
@@ -2675,7 +2675,7 @@
           <a:p>
             <a:fld id="{B7D86ACC-9484-4F16-AB93-B0E4D21DC411}" type="datetime1">
               <a:rPr lang="en-US" smtClean="0"/>
-              <a:t>4/6/2020</a:t>
+              <a:t>4/9/2020</a:t>
             </a:fld>
             <a:endParaRPr lang="de-DE" dirty="0"/>
           </a:p>
@@ -3233,7 +3233,7 @@
           <a:p>
             <a:fld id="{2C461D42-C5E4-43E4-8F72-CBFCDD5F4350}" type="datetime1">
               <a:rPr lang="en-US" smtClean="0"/>
-              <a:t>4/6/2020</a:t>
+              <a:t>4/9/2020</a:t>
             </a:fld>
             <a:endParaRPr lang="de-DE" dirty="0"/>
           </a:p>
@@ -3742,7 +3742,7 @@
           <a:p>
             <a:fld id="{049074FD-5D2D-4B57-AF59-53C415C7D24E}" type="datetime1">
               <a:rPr lang="en-US" smtClean="0"/>
-              <a:t>4/6/2020</a:t>
+              <a:t>4/9/2020</a:t>
             </a:fld>
             <a:endParaRPr lang="de-DE" dirty="0"/>
           </a:p>
@@ -4180,7 +4180,7 @@
           <a:p>
             <a:fld id="{29A4DDCA-DDA1-483C-B65F-F4EBC950A2F6}" type="datetime1">
               <a:rPr lang="en-US" smtClean="0"/>
-              <a:t>4/6/2020</a:t>
+              <a:t>4/9/2020</a:t>
             </a:fld>
             <a:endParaRPr lang="de-DE" dirty="0"/>
           </a:p>
@@ -4710,7 +4710,7 @@
           <a:p>
             <a:fld id="{4E3B5791-0EF2-42EE-A99C-3B9661FA44F7}" type="datetime1">
               <a:rPr lang="en-US" smtClean="0"/>
-              <a:t>4/6/2020</a:t>
+              <a:t>4/9/2020</a:t>
             </a:fld>
             <a:endParaRPr lang="de-DE" dirty="0"/>
           </a:p>
@@ -4843,7 +4843,7 @@
           <a:p>
             <a:fld id="{E7605D58-F700-4484-B523-2DCBBB2C34EA}" type="datetime1">
               <a:rPr lang="en-US" smtClean="0"/>
-              <a:t>4/6/2020</a:t>
+              <a:t>4/9/2020</a:t>
             </a:fld>
             <a:endParaRPr lang="de-DE" dirty="0"/>
           </a:p>
@@ -5416,7 +5416,7 @@
           <a:p>
             <a:fld id="{61E8988A-605A-45F7-A956-2C7CBF14BF70}" type="datetime1">
               <a:rPr lang="en-US" smtClean="0"/>
-              <a:t>4/6/2020</a:t>
+              <a:t>4/9/2020</a:t>
             </a:fld>
             <a:endParaRPr lang="de-DE" dirty="0"/>
           </a:p>
@@ -6138,7 +6138,7 @@
           <a:p>
             <a:fld id="{12245166-F350-4788-9C76-1DDCA01696E0}" type="datetime1">
               <a:rPr lang="en-US" altLang="zh-CN" smtClean="0"/>
-              <a:t>4/6/2020</a:t>
+              <a:t>4/9/2020</a:t>
             </a:fld>
             <a:endParaRPr lang="de-DE" dirty="0"/>
           </a:p>
@@ -6716,7 +6716,7 @@
           <a:p>
             <a:fld id="{3FFEBAD8-45B6-4E92-A3B0-4A173AC485B2}" type="datetime1">
               <a:rPr lang="en-US" smtClean="0"/>
-              <a:t>4/6/2020</a:t>
+              <a:t>4/9/2020</a:t>
             </a:fld>
             <a:endParaRPr lang="de-DE" dirty="0"/>
           </a:p>
@@ -7052,7 +7052,7 @@
           <a:p>
             <a:fld id="{6FD4E149-14E8-4ABE-8531-82036B4997CF}" type="datetime1">
               <a:rPr lang="en-US" smtClean="0"/>
-              <a:t>4/6/2020</a:t>
+              <a:t>4/9/2020</a:t>
             </a:fld>
             <a:endParaRPr lang="de-DE" dirty="0"/>
           </a:p>
@@ -7362,7 +7362,7 @@
           <a:p>
             <a:fld id="{18301BAF-44E0-4443-8EB7-B3466E8AE8C0}" type="datetime1">
               <a:rPr lang="en-US" smtClean="0"/>
-              <a:t>4/6/2020</a:t>
+              <a:t>4/9/2020</a:t>
             </a:fld>
             <a:endParaRPr lang="de-DE" dirty="0"/>
           </a:p>
@@ -7790,7 +7790,7 @@
           <a:p>
             <a:fld id="{A503C99D-EB16-4094-8A44-F9BD6A011BFE}" type="datetime1">
               <a:rPr lang="en-US" smtClean="0"/>
-              <a:t>4/6/2020</a:t>
+              <a:t>4/9/2020</a:t>
             </a:fld>
             <a:endParaRPr lang="de-DE" dirty="0"/>
           </a:p>
@@ -8218,7 +8218,7 @@
           <a:p>
             <a:fld id="{03D0FB31-02A1-4167-B8F0-2A31270CEB45}" type="datetime1">
               <a:rPr lang="en-US" smtClean="0"/>
-              <a:t>4/6/2020</a:t>
+              <a:t>4/9/2020</a:t>
             </a:fld>
             <a:endParaRPr lang="de-DE" dirty="0"/>
           </a:p>
@@ -8554,7 +8554,7 @@
           <a:p>
             <a:fld id="{82E9BD3E-CC8A-43AD-9611-8E6DB87A71E3}" type="datetime1">
               <a:rPr lang="en-US" smtClean="0"/>
-              <a:t>4/6/2020</a:t>
+              <a:t>4/9/2020</a:t>
             </a:fld>
             <a:endParaRPr lang="de-DE" dirty="0"/>
           </a:p>
@@ -9089,7 +9089,7 @@
           <a:p>
             <a:fld id="{42EBD230-2134-41BA-9288-19F2F149C63A}" type="datetime1">
               <a:rPr lang="en-US" smtClean="0"/>
-              <a:t>4/6/2020</a:t>
+              <a:t>4/9/2020</a:t>
             </a:fld>
             <a:endParaRPr lang="de-DE" dirty="0"/>
           </a:p>
@@ -9434,7 +9434,7 @@
           <a:p>
             <a:fld id="{17A8BE9B-DA03-46A4-9F82-FC1F140F2E20}" type="datetime1">
               <a:rPr lang="en-US" smtClean="0"/>
-              <a:t>4/6/2020</a:t>
+              <a:t>4/9/2020</a:t>
             </a:fld>
             <a:endParaRPr lang="de-DE" dirty="0"/>
           </a:p>
@@ -10220,7 +10220,7 @@
                   <a:schemeClr val="bg1"/>
                 </a:solidFill>
               </a:rPr>
-              <a:t>4/6/2020</a:t>
+              <a:t>4/9/2020</a:t>
             </a:fld>
             <a:endParaRPr lang="en-US" altLang="zh-CN" dirty="0">
               <a:solidFill>
@@ -10431,7 +10431,7 @@
                   <a:schemeClr val="bg1"/>
                 </a:solidFill>
               </a:rPr>
-              <a:t>4/6/2020</a:t>
+              <a:t>4/9/2020</a:t>
             </a:fld>
             <a:endParaRPr lang="de-DE" dirty="0">
               <a:solidFill>
@@ -10950,7 +10950,7 @@
                   <a:schemeClr val="bg1"/>
                 </a:solidFill>
               </a:rPr>
-              <a:t>4/6/2020</a:t>
+              <a:t>4/9/2020</a:t>
             </a:fld>
             <a:endParaRPr lang="de-DE" dirty="0">
               <a:solidFill>
@@ -11444,7 +11444,7 @@
                   <a:schemeClr val="bg1"/>
                 </a:solidFill>
               </a:rPr>
-              <a:t>4/6/2020</a:t>
+              <a:t>4/9/2020</a:t>
             </a:fld>
             <a:endParaRPr lang="de-DE" dirty="0">
               <a:solidFill>
@@ -11639,11 +11639,7 @@
             </a:r>
             <a:r>
               <a:rPr lang="zh-CN" altLang="en-US" sz="1600" b="1" dirty="0" smtClean="0"/>
-              <a:t>自带的过滤功能</a:t>
-            </a:r>
-            <a:r>
-              <a:rPr lang="zh-CN" altLang="en-US" sz="1600" b="1" dirty="0" smtClean="0"/>
-              <a:t>。</a:t>
+              <a:t>自带的过滤功能。</a:t>
             </a:r>
             <a:endParaRPr lang="en-US" altLang="zh-CN" sz="1600" b="1" dirty="0" smtClean="0"/>
           </a:p>
@@ -11654,17 +11650,12 @@
             </a:pPr>
             <a:r>
               <a:rPr lang="zh-CN" altLang="en-US" sz="1600" b="1" dirty="0" smtClean="0"/>
-              <a:t>以逆时针（</a:t>
+              <a:t>设置</a:t>
             </a:r>
             <a:r>
               <a:rPr lang="en-US" altLang="zh-CN" sz="1600" b="1" dirty="0" smtClean="0"/>
-              <a:t>CCW</a:t>
-            </a:r>
-            <a:r>
-              <a:rPr lang="zh-CN" altLang="en-US" sz="1600" b="1" smtClean="0"/>
-              <a:t>）为正方向</a:t>
-            </a:r>
-            <a:endParaRPr lang="en-US" altLang="zh-CN" sz="1600" b="1" dirty="0" smtClean="0"/>
+              <a:t>CW/CCW</a:t>
+            </a:r>
           </a:p>
           <a:p>
             <a:pPr marL="285750" indent="-285750">
@@ -12067,7 +12058,7 @@
                   <a:schemeClr val="bg1"/>
                 </a:solidFill>
               </a:rPr>
-              <a:t>4/6/2020</a:t>
+              <a:t>4/9/2020</a:t>
             </a:fld>
             <a:endParaRPr lang="de-DE" dirty="0">
               <a:solidFill>
@@ -12154,7 +12145,7 @@
         <p:spPr>
           <a:xfrm>
             <a:off x="107504" y="514876"/>
-            <a:ext cx="8424936" cy="4093428"/>
+            <a:ext cx="8784976" cy="3662541"/>
           </a:xfrm>
           <a:prstGeom prst="rect">
             <a:avLst/>
@@ -12194,58 +12185,58 @@
               <a:buChar char="•"/>
             </a:pPr>
             <a:r>
-              <a:rPr lang="en-US" altLang="zh-CN" sz="1600" b="1" dirty="0"/>
+              <a:rPr lang="en-US" altLang="zh-CN" sz="1400" b="1" dirty="0"/>
               <a:t>b</a:t>
             </a:r>
             <a:r>
-              <a:rPr lang="en-US" altLang="zh-CN" sz="1600" b="1" dirty="0" smtClean="0"/>
+              <a:rPr lang="en-US" altLang="zh-CN" sz="1400" b="1" dirty="0" smtClean="0"/>
               <a:t>ool </a:t>
             </a:r>
             <a:r>
-              <a:rPr lang="en-US" altLang="zh-CN" sz="1600" b="1" dirty="0" err="1" smtClean="0"/>
+              <a:rPr lang="en-US" altLang="zh-CN" sz="1400" b="1" dirty="0" err="1" smtClean="0"/>
               <a:t>InitAPI</a:t>
             </a:r>
             <a:r>
-              <a:rPr lang="en-US" altLang="zh-CN" sz="1600" b="1" dirty="0" smtClean="0"/>
+              <a:rPr lang="en-US" altLang="zh-CN" sz="1400" b="1" dirty="0" smtClean="0"/>
               <a:t>()</a:t>
             </a:r>
             <a:r>
-              <a:rPr lang="zh-CN" altLang="en-US" sz="1600" b="1" dirty="0" smtClean="0"/>
+              <a:rPr lang="zh-CN" altLang="en-US" sz="1400" b="1" dirty="0" smtClean="0"/>
               <a:t>：用于载入</a:t>
             </a:r>
             <a:r>
-              <a:rPr lang="en-US" altLang="zh-CN" sz="1600" b="1" dirty="0" err="1" smtClean="0"/>
+              <a:rPr lang="en-US" altLang="zh-CN" sz="1400" b="1" dirty="0" err="1" smtClean="0"/>
               <a:t>Config</a:t>
             </a:r>
             <a:r>
-              <a:rPr lang="zh-CN" altLang="en-US" sz="1600" b="1" dirty="0" smtClean="0"/>
+              <a:rPr lang="zh-CN" altLang="en-US" sz="1400" b="1" dirty="0" smtClean="0"/>
               <a:t>文件，并进行初始化，返回类型为布尔类型，即：</a:t>
             </a:r>
             <a:r>
-              <a:rPr lang="en-US" altLang="zh-CN" sz="1600" b="1" dirty="0" smtClean="0"/>
+              <a:rPr lang="en-US" altLang="zh-CN" sz="1400" b="1" dirty="0" smtClean="0"/>
               <a:t>true</a:t>
             </a:r>
             <a:r>
-              <a:rPr lang="zh-CN" altLang="en-US" sz="1600" b="1" dirty="0" smtClean="0"/>
+              <a:rPr lang="zh-CN" altLang="en-US" sz="1400" b="1" dirty="0" smtClean="0"/>
               <a:t>为成功，</a:t>
             </a:r>
             <a:r>
-              <a:rPr lang="en-US" altLang="zh-CN" sz="1600" b="1" dirty="0" smtClean="0"/>
+              <a:rPr lang="en-US" altLang="zh-CN" sz="1400" b="1" dirty="0" smtClean="0"/>
               <a:t>false</a:t>
             </a:r>
             <a:r>
-              <a:rPr lang="zh-CN" altLang="en-US" sz="1600" b="1" dirty="0" smtClean="0"/>
+              <a:rPr lang="zh-CN" altLang="en-US" sz="1400" b="1" dirty="0" smtClean="0"/>
               <a:t>为失败，如果失败请检查</a:t>
             </a:r>
             <a:r>
-              <a:rPr lang="en-US" altLang="zh-CN" sz="1600" b="1" dirty="0" err="1" smtClean="0"/>
+              <a:rPr lang="en-US" altLang="zh-CN" sz="1400" b="1" dirty="0" err="1" smtClean="0"/>
               <a:t>Config</a:t>
             </a:r>
             <a:r>
-              <a:rPr lang="zh-CN" altLang="en-US" sz="1600" b="1" dirty="0" smtClean="0"/>
+              <a:rPr lang="zh-CN" altLang="en-US" sz="1400" b="1" dirty="0" smtClean="0"/>
               <a:t>文件是否存在、文件格式是否正确</a:t>
             </a:r>
-            <a:endParaRPr lang="en-US" altLang="zh-CN" sz="1600" b="1" dirty="0" smtClean="0"/>
+            <a:endParaRPr lang="en-US" altLang="zh-CN" sz="1400" b="1" dirty="0" smtClean="0"/>
           </a:p>
           <a:p>
             <a:pPr marL="285750" indent="-285750">
@@ -12253,54 +12244,54 @@
               <a:buChar char="•"/>
             </a:pPr>
             <a:r>
-              <a:rPr lang="en-US" altLang="zh-CN" sz="1600" b="1" dirty="0"/>
+              <a:rPr lang="en-US" altLang="zh-CN" sz="1400" b="1" dirty="0"/>
               <a:t>bool </a:t>
             </a:r>
             <a:r>
-              <a:rPr lang="en-US" altLang="zh-CN" sz="1600" b="1" dirty="0" err="1"/>
+              <a:rPr lang="en-US" altLang="zh-CN" sz="1400" b="1" dirty="0" err="1"/>
               <a:t>StartGroup</a:t>
             </a:r>
             <a:r>
-              <a:rPr lang="en-US" altLang="zh-CN" sz="1600" b="1" dirty="0"/>
+              <a:rPr lang="en-US" altLang="zh-CN" sz="1400" b="1" dirty="0"/>
               <a:t>(</a:t>
             </a:r>
             <a:r>
-              <a:rPr lang="en-US" altLang="zh-CN" sz="1600" b="1" dirty="0" err="1"/>
+              <a:rPr lang="en-US" altLang="zh-CN" sz="1400" b="1" dirty="0" err="1"/>
               <a:t>int</a:t>
             </a:r>
             <a:r>
-              <a:rPr lang="en-US" altLang="zh-CN" sz="1600" b="1" dirty="0"/>
+              <a:rPr lang="en-US" altLang="zh-CN" sz="1400" b="1" dirty="0"/>
               <a:t> </a:t>
             </a:r>
             <a:r>
-              <a:rPr lang="en-US" altLang="zh-CN" sz="1600" b="1" dirty="0" err="1"/>
+              <a:rPr lang="en-US" altLang="zh-CN" sz="1400" b="1" dirty="0" err="1"/>
               <a:t>i_Group</a:t>
             </a:r>
             <a:r>
-              <a:rPr lang="en-US" altLang="zh-CN" sz="1600" b="1" dirty="0" smtClean="0"/>
+              <a:rPr lang="en-US" altLang="zh-CN" sz="1400" b="1" dirty="0" smtClean="0"/>
               <a:t>):</a:t>
             </a:r>
             <a:r>
-              <a:rPr lang="zh-CN" altLang="en-US" sz="1600" b="1" dirty="0" smtClean="0"/>
+              <a:rPr lang="zh-CN" altLang="en-US" sz="1400" b="1" dirty="0" smtClean="0"/>
               <a:t>启用一个分组，参数为</a:t>
             </a:r>
             <a:r>
-              <a:rPr lang="en-US" altLang="zh-CN" sz="1600" b="1" dirty="0" err="1" smtClean="0"/>
+              <a:rPr lang="en-US" altLang="zh-CN" sz="1400" b="1" dirty="0" err="1" smtClean="0"/>
               <a:t>Config</a:t>
             </a:r>
             <a:r>
-              <a:rPr lang="zh-CN" altLang="en-US" sz="1600" b="1" dirty="0" smtClean="0"/>
+              <a:rPr lang="zh-CN" altLang="en-US" sz="1400" b="1" dirty="0" smtClean="0"/>
               <a:t>中的分组编号，从</a:t>
             </a:r>
             <a:r>
-              <a:rPr lang="en-US" altLang="zh-CN" sz="1600" b="1" dirty="0" smtClean="0"/>
+              <a:rPr lang="en-US" altLang="zh-CN" sz="1400" b="1" dirty="0" smtClean="0"/>
               <a:t>1</a:t>
             </a:r>
             <a:r>
-              <a:rPr lang="zh-CN" altLang="en-US" sz="1600" b="1" dirty="0" smtClean="0"/>
+              <a:rPr lang="zh-CN" altLang="en-US" sz="1400" b="1" dirty="0" smtClean="0"/>
               <a:t>开始，返回成功或失败</a:t>
             </a:r>
-            <a:endParaRPr lang="en-US" altLang="zh-CN" sz="1600" b="1" dirty="0" smtClean="0"/>
+            <a:endParaRPr lang="en-US" altLang="zh-CN" sz="1400" b="1" dirty="0" smtClean="0"/>
           </a:p>
           <a:p>
             <a:pPr marL="285750" indent="-285750">
@@ -12308,62 +12299,62 @@
               <a:buChar char="•"/>
             </a:pPr>
             <a:r>
-              <a:rPr lang="en-US" altLang="zh-CN" sz="1600" b="1" dirty="0"/>
+              <a:rPr lang="en-US" altLang="zh-CN" sz="1400" b="1" dirty="0"/>
               <a:t>bool </a:t>
             </a:r>
             <a:r>
-              <a:rPr lang="en-US" altLang="zh-CN" sz="1600" b="1" dirty="0" err="1"/>
+              <a:rPr lang="en-US" altLang="zh-CN" sz="1400" b="1" dirty="0" err="1"/>
               <a:t>StopGroup</a:t>
             </a:r>
             <a:r>
-              <a:rPr lang="en-US" altLang="zh-CN" sz="1600" b="1" dirty="0"/>
+              <a:rPr lang="en-US" altLang="zh-CN" sz="1400" b="1" dirty="0"/>
               <a:t>(</a:t>
             </a:r>
             <a:r>
-              <a:rPr lang="en-US" altLang="zh-CN" sz="1600" b="1" dirty="0" err="1"/>
+              <a:rPr lang="en-US" altLang="zh-CN" sz="1400" b="1" dirty="0" err="1"/>
               <a:t>int</a:t>
             </a:r>
             <a:r>
-              <a:rPr lang="en-US" altLang="zh-CN" sz="1600" b="1" dirty="0"/>
+              <a:rPr lang="en-US" altLang="zh-CN" sz="1400" b="1" dirty="0"/>
               <a:t> </a:t>
             </a:r>
             <a:r>
-              <a:rPr lang="en-US" altLang="zh-CN" sz="1600" b="1" dirty="0" err="1"/>
+              <a:rPr lang="en-US" altLang="zh-CN" sz="1400" b="1" dirty="0" err="1"/>
               <a:t>i_Group</a:t>
             </a:r>
             <a:r>
-              <a:rPr lang="en-US" altLang="zh-CN" sz="1600" b="1" dirty="0" smtClean="0"/>
+              <a:rPr lang="en-US" altLang="zh-CN" sz="1400" b="1" dirty="0" smtClean="0"/>
               <a:t>)</a:t>
             </a:r>
             <a:r>
-              <a:rPr lang="zh-CN" altLang="en-US" sz="1600" b="1" dirty="0" smtClean="0"/>
+              <a:rPr lang="zh-CN" altLang="en-US" sz="1400" b="1" dirty="0" smtClean="0"/>
               <a:t>：停止指定一</a:t>
             </a:r>
             <a:r>
-              <a:rPr lang="zh-CN" altLang="en-US" sz="1600" b="1" dirty="0"/>
+              <a:rPr lang="zh-CN" altLang="en-US" sz="1400" b="1" dirty="0"/>
               <a:t>个分组，参数为</a:t>
             </a:r>
             <a:r>
-              <a:rPr lang="en-US" altLang="zh-CN" sz="1600" b="1" dirty="0" err="1"/>
+              <a:rPr lang="en-US" altLang="zh-CN" sz="1400" b="1" dirty="0" err="1"/>
               <a:t>Config</a:t>
             </a:r>
             <a:r>
-              <a:rPr lang="zh-CN" altLang="en-US" sz="1600" b="1" dirty="0"/>
+              <a:rPr lang="zh-CN" altLang="en-US" sz="1400" b="1" dirty="0"/>
               <a:t>中的分组编号，从</a:t>
             </a:r>
             <a:r>
-              <a:rPr lang="en-US" altLang="zh-CN" sz="1600" b="1" dirty="0"/>
+              <a:rPr lang="en-US" altLang="zh-CN" sz="1400" b="1" dirty="0"/>
               <a:t>1</a:t>
             </a:r>
             <a:r>
-              <a:rPr lang="zh-CN" altLang="en-US" sz="1600" b="1" dirty="0"/>
+              <a:rPr lang="zh-CN" altLang="en-US" sz="1400" b="1" dirty="0"/>
               <a:t>开始，返回成功或</a:t>
             </a:r>
             <a:r>
-              <a:rPr lang="zh-CN" altLang="en-US" sz="1600" b="1" dirty="0" smtClean="0"/>
+              <a:rPr lang="zh-CN" altLang="en-US" sz="1400" b="1" dirty="0" smtClean="0"/>
               <a:t>失败</a:t>
             </a:r>
-            <a:endParaRPr lang="en-US" altLang="zh-CN" sz="1600" b="1" dirty="0" smtClean="0"/>
+            <a:endParaRPr lang="en-US" altLang="zh-CN" sz="1400" b="1" dirty="0" smtClean="0"/>
           </a:p>
           <a:p>
             <a:pPr marL="285750" indent="-285750">
@@ -12371,22 +12362,22 @@
               <a:buChar char="•"/>
             </a:pPr>
             <a:r>
-              <a:rPr lang="en-US" altLang="zh-CN" sz="1600" b="1" dirty="0" err="1"/>
+              <a:rPr lang="en-US" altLang="zh-CN" sz="1400" b="1" dirty="0" err="1"/>
               <a:t>int</a:t>
             </a:r>
             <a:r>
-              <a:rPr lang="en-US" altLang="zh-CN" sz="1600" b="1" dirty="0"/>
+              <a:rPr lang="en-US" altLang="zh-CN" sz="1400" b="1" dirty="0"/>
               <a:t> </a:t>
             </a:r>
             <a:r>
-              <a:rPr lang="en-US" altLang="zh-CN" sz="1600" b="1" dirty="0" err="1" smtClean="0"/>
+              <a:rPr lang="en-US" altLang="zh-CN" sz="1400" b="1" dirty="0" err="1" smtClean="0"/>
               <a:t>AllGroupNum</a:t>
             </a:r>
             <a:r>
-              <a:rPr lang="zh-CN" altLang="en-US" sz="1600" b="1" dirty="0" smtClean="0"/>
+              <a:rPr lang="zh-CN" altLang="en-US" sz="1400" b="1" dirty="0" smtClean="0"/>
               <a:t>：当前配置文件所有分组数</a:t>
             </a:r>
-            <a:endParaRPr lang="en-US" altLang="zh-CN" sz="1600" b="1" dirty="0" smtClean="0"/>
+            <a:endParaRPr lang="en-US" altLang="zh-CN" sz="1400" b="1" dirty="0" smtClean="0"/>
           </a:p>
           <a:p>
             <a:pPr marL="285750" indent="-285750">
@@ -12394,30 +12385,30 @@
               <a:buChar char="•"/>
             </a:pPr>
             <a:r>
-              <a:rPr lang="en-US" altLang="zh-CN" sz="1600" b="1" dirty="0" err="1"/>
+              <a:rPr lang="en-US" altLang="zh-CN" sz="1400" b="1" dirty="0" err="1"/>
               <a:t>int</a:t>
             </a:r>
             <a:r>
-              <a:rPr lang="en-US" altLang="zh-CN" sz="1600" b="1" dirty="0"/>
+              <a:rPr lang="en-US" altLang="zh-CN" sz="1400" b="1" dirty="0"/>
               <a:t> </a:t>
             </a:r>
             <a:r>
-              <a:rPr lang="en-US" altLang="zh-CN" sz="1600" b="1" dirty="0" err="1" smtClean="0"/>
+              <a:rPr lang="en-US" altLang="zh-CN" sz="1400" b="1" dirty="0" err="1" smtClean="0"/>
               <a:t>ZoneofGroup</a:t>
             </a:r>
             <a:r>
-              <a:rPr lang="zh-CN" altLang="en-US" sz="1600" b="1" dirty="0" smtClean="0"/>
+              <a:rPr lang="zh-CN" altLang="en-US" sz="1400" b="1" dirty="0" smtClean="0"/>
               <a:t>：当前</a:t>
             </a:r>
             <a:r>
-              <a:rPr lang="zh-CN" altLang="en-US" sz="1600" b="1" dirty="0"/>
+              <a:rPr lang="zh-CN" altLang="en-US" sz="1400" b="1" dirty="0"/>
               <a:t>组的区域</a:t>
             </a:r>
             <a:r>
-              <a:rPr lang="zh-CN" altLang="en-US" sz="1600" b="1" dirty="0" smtClean="0"/>
+              <a:rPr lang="zh-CN" altLang="en-US" sz="1400" b="1" dirty="0" smtClean="0"/>
               <a:t>数</a:t>
             </a:r>
-            <a:endParaRPr lang="en-US" altLang="zh-CN" sz="1600" b="1" dirty="0" smtClean="0"/>
+            <a:endParaRPr lang="en-US" altLang="zh-CN" sz="1400" b="1" dirty="0" smtClean="0"/>
           </a:p>
           <a:p>
             <a:pPr marL="285750" indent="-285750">
@@ -12425,30 +12416,30 @@
               <a:buChar char="•"/>
             </a:pPr>
             <a:r>
-              <a:rPr lang="en-US" altLang="zh-CN" sz="1600" b="1" dirty="0" err="1"/>
+              <a:rPr lang="en-US" altLang="zh-CN" sz="1400" b="1" dirty="0" err="1"/>
               <a:t>int</a:t>
             </a:r>
             <a:r>
-              <a:rPr lang="en-US" altLang="zh-CN" sz="1600" b="1" dirty="0"/>
+              <a:rPr lang="en-US" altLang="zh-CN" sz="1400" b="1" dirty="0"/>
               <a:t> </a:t>
             </a:r>
             <a:r>
-              <a:rPr lang="en-US" altLang="zh-CN" sz="1600" b="1" dirty="0" smtClean="0"/>
+              <a:rPr lang="en-US" altLang="zh-CN" sz="1400" b="1" dirty="0" smtClean="0"/>
               <a:t>Group</a:t>
             </a:r>
             <a:r>
-              <a:rPr lang="zh-CN" altLang="en-US" sz="1600" b="1" dirty="0" smtClean="0"/>
+              <a:rPr lang="zh-CN" altLang="en-US" sz="1400" b="1" dirty="0" smtClean="0"/>
               <a:t>：当前</a:t>
             </a:r>
             <a:r>
-              <a:rPr lang="zh-CN" altLang="en-US" sz="1600" b="1" dirty="0"/>
+              <a:rPr lang="zh-CN" altLang="en-US" sz="1400" b="1" dirty="0"/>
               <a:t>使用的分组</a:t>
             </a:r>
             <a:r>
-              <a:rPr lang="zh-CN" altLang="en-US" sz="1600" b="1" dirty="0" smtClean="0"/>
+              <a:rPr lang="zh-CN" altLang="en-US" sz="1400" b="1" dirty="0" smtClean="0"/>
               <a:t>编号</a:t>
             </a:r>
-            <a:endParaRPr lang="en-US" altLang="zh-CN" sz="1600" b="1" dirty="0" smtClean="0"/>
+            <a:endParaRPr lang="en-US" altLang="zh-CN" sz="1400" b="1" dirty="0" smtClean="0"/>
           </a:p>
           <a:p>
             <a:pPr marL="285750" indent="-285750">
@@ -12456,26 +12447,26 @@
               <a:buChar char="•"/>
             </a:pPr>
             <a:r>
-              <a:rPr lang="en-US" altLang="zh-CN" sz="1600" b="1" dirty="0"/>
+              <a:rPr lang="en-US" altLang="zh-CN" sz="1400" b="1" dirty="0"/>
               <a:t>bool </a:t>
             </a:r>
             <a:r>
-              <a:rPr lang="en-US" altLang="zh-CN" sz="1600" b="1" dirty="0" err="1" smtClean="0"/>
+              <a:rPr lang="en-US" altLang="zh-CN" sz="1400" b="1" dirty="0" err="1" smtClean="0"/>
               <a:t>b_Init</a:t>
             </a:r>
             <a:r>
-              <a:rPr lang="zh-CN" altLang="en-US" sz="1600" b="1" dirty="0" smtClean="0"/>
+              <a:rPr lang="zh-CN" altLang="en-US" sz="1400" b="1" dirty="0" smtClean="0"/>
               <a:t>：初始化状态，</a:t>
             </a:r>
             <a:r>
-              <a:rPr lang="en-US" altLang="zh-CN" sz="1600" b="1" dirty="0" smtClean="0"/>
+              <a:rPr lang="en-US" altLang="zh-CN" sz="1400" b="1" dirty="0" smtClean="0"/>
               <a:t>true</a:t>
             </a:r>
             <a:r>
-              <a:rPr lang="zh-CN" altLang="en-US" sz="1600" b="1" dirty="0" smtClean="0"/>
+              <a:rPr lang="zh-CN" altLang="en-US" sz="1400" b="1" dirty="0" smtClean="0"/>
               <a:t>为已经初始化成功</a:t>
             </a:r>
-            <a:endParaRPr lang="en-US" altLang="zh-CN" sz="1600" b="1" dirty="0" smtClean="0"/>
+            <a:endParaRPr lang="en-US" altLang="zh-CN" sz="1400" b="1" dirty="0" smtClean="0"/>
           </a:p>
           <a:p>
             <a:pPr marL="285750" indent="-285750">
@@ -12483,59 +12474,59 @@
               <a:buChar char="•"/>
             </a:pPr>
             <a:r>
-              <a:rPr lang="en-US" altLang="zh-CN" sz="1600" b="1" dirty="0" smtClean="0"/>
+              <a:rPr lang="en-US" altLang="zh-CN" sz="1400" b="1" dirty="0" smtClean="0"/>
               <a:t>bool *</a:t>
             </a:r>
             <a:r>
-              <a:rPr lang="en-US" altLang="zh-CN" sz="1600" b="1" dirty="0" err="1" smtClean="0"/>
+              <a:rPr lang="en-US" altLang="zh-CN" sz="1400" b="1" dirty="0" err="1" smtClean="0"/>
               <a:t>GetStatus</a:t>
             </a:r>
             <a:r>
-              <a:rPr lang="en-US" altLang="zh-CN" sz="1600" b="1" dirty="0" smtClean="0"/>
+              <a:rPr lang="en-US" altLang="zh-CN" sz="1400" b="1" dirty="0" smtClean="0"/>
               <a:t>(char</a:t>
             </a:r>
             <a:r>
-              <a:rPr lang="en-US" altLang="zh-CN" sz="1600" b="1" dirty="0"/>
+              <a:rPr lang="en-US" altLang="zh-CN" sz="1400" b="1" dirty="0"/>
               <a:t>* </a:t>
             </a:r>
             <a:r>
-              <a:rPr lang="en-US" altLang="zh-CN" sz="1600" b="1" dirty="0" err="1"/>
+              <a:rPr lang="en-US" altLang="zh-CN" sz="1400" b="1" dirty="0" err="1"/>
               <a:t>PointBuffer</a:t>
             </a:r>
             <a:r>
-              <a:rPr lang="en-US" altLang="zh-CN" sz="1600" b="1" dirty="0"/>
+              <a:rPr lang="en-US" altLang="zh-CN" sz="1400" b="1" dirty="0"/>
               <a:t>)</a:t>
             </a:r>
             <a:r>
-              <a:rPr lang="zh-CN" altLang="en-US" sz="1600" b="1" dirty="0" smtClean="0"/>
+              <a:rPr lang="zh-CN" altLang="en-US" sz="1400" b="1" dirty="0" smtClean="0"/>
               <a:t>：获取当前分组状态（是否有障碍物在区域内），返回为</a:t>
             </a:r>
             <a:r>
-              <a:rPr lang="en-US" altLang="zh-CN" sz="1600" b="1" dirty="0" smtClean="0"/>
+              <a:rPr lang="en-US" altLang="zh-CN" sz="1400" b="1" dirty="0" smtClean="0"/>
               <a:t>bool</a:t>
             </a:r>
             <a:r>
-              <a:rPr lang="zh-CN" altLang="en-US" sz="1600" b="1" dirty="0" smtClean="0"/>
+              <a:rPr lang="zh-CN" altLang="en-US" sz="1400" b="1" dirty="0" smtClean="0"/>
               <a:t>数组，包含每个区域状态，</a:t>
             </a:r>
             <a:r>
-              <a:rPr lang="en-US" altLang="zh-CN" sz="1600" b="1" dirty="0" smtClean="0"/>
+              <a:rPr lang="en-US" altLang="zh-CN" sz="1400" b="1" dirty="0" smtClean="0"/>
               <a:t>bool</a:t>
             </a:r>
             <a:r>
-              <a:rPr lang="zh-CN" altLang="en-US" sz="1600" b="1" dirty="0" smtClean="0"/>
+              <a:rPr lang="zh-CN" altLang="en-US" sz="1400" b="1" dirty="0" smtClean="0"/>
               <a:t>数组个数为当前分组区域个数，参数为</a:t>
             </a:r>
             <a:r>
-              <a:rPr lang="en-US" altLang="zh-CN" sz="1600" b="1" dirty="0" smtClean="0"/>
+              <a:rPr lang="en-US" altLang="zh-CN" sz="1400" b="1" dirty="0" smtClean="0"/>
               <a:t>R2000</a:t>
             </a:r>
             <a:r>
-              <a:rPr lang="zh-CN" altLang="en-US" sz="1600" b="1" dirty="0" smtClean="0"/>
+              <a:rPr lang="zh-CN" altLang="en-US" sz="1400" b="1" dirty="0" smtClean="0"/>
               <a:t>原始数据，</a:t>
             </a:r>
             <a:r>
-              <a:rPr lang="zh-CN" altLang="en-US" sz="1600" b="1" dirty="0" smtClean="0">
+              <a:rPr lang="zh-CN" altLang="en-US" sz="1400" b="1" dirty="0" smtClean="0">
                 <a:solidFill>
                   <a:srgbClr val="FF0000"/>
                 </a:solidFill>
@@ -12543,7 +12534,7 @@
               <a:t>数据类型为“</a:t>
             </a:r>
             <a:r>
-              <a:rPr lang="en-US" altLang="zh-CN" sz="1600" b="1" dirty="0" smtClean="0">
+              <a:rPr lang="en-US" altLang="zh-CN" sz="1400" b="1" dirty="0" smtClean="0">
                 <a:solidFill>
                   <a:srgbClr val="FF0000"/>
                 </a:solidFill>
@@ -12551,14 +12542,14 @@
               <a:t>B</a:t>
             </a:r>
             <a:r>
-              <a:rPr lang="zh-CN" altLang="en-US" sz="1600" b="1" dirty="0" smtClean="0">
+              <a:rPr lang="zh-CN" altLang="en-US" sz="1400" b="1" dirty="0" smtClean="0">
                 <a:solidFill>
                   <a:srgbClr val="FF0000"/>
                 </a:solidFill>
               </a:rPr>
               <a:t>”！</a:t>
             </a:r>
-            <a:endParaRPr lang="en-US" altLang="zh-CN" sz="1600" b="1" dirty="0" smtClean="0">
+            <a:endParaRPr lang="en-US" altLang="zh-CN" sz="1400" b="1" dirty="0" smtClean="0">
               <a:solidFill>
                 <a:srgbClr val="FF0000"/>
               </a:solidFill>
@@ -12570,38 +12561,121 @@
               <a:buChar char="•"/>
             </a:pPr>
             <a:r>
-              <a:rPr lang="en-US" altLang="zh-CN" sz="1600" b="1" dirty="0"/>
+              <a:rPr lang="en-US" altLang="zh-CN" sz="1400" b="1" dirty="0"/>
+              <a:t>b</a:t>
+            </a:r>
+            <a:r>
+              <a:rPr lang="en-US" altLang="zh-CN" sz="1400" b="1" dirty="0" smtClean="0"/>
+              <a:t>ool </a:t>
+            </a:r>
+            <a:r>
+              <a:rPr lang="en-US" altLang="zh-CN" sz="1400" b="1" dirty="0" err="1" smtClean="0"/>
+              <a:t>SetCW_CCW</a:t>
+            </a:r>
+            <a:r>
+              <a:rPr lang="en-US" altLang="zh-CN" sz="1400" b="1" dirty="0" smtClean="0"/>
+              <a:t>(bool </a:t>
+            </a:r>
+            <a:r>
+              <a:rPr lang="en-US" altLang="zh-CN" sz="1400" b="1" dirty="0"/>
+              <a:t>CW_CCW</a:t>
+            </a:r>
+            <a:r>
+              <a:rPr lang="en-US" altLang="zh-CN" sz="1400" b="1" dirty="0" smtClean="0"/>
+              <a:t>)</a:t>
+            </a:r>
+            <a:r>
+              <a:rPr lang="zh-CN" altLang="en-US" sz="1400" b="1" dirty="0" smtClean="0"/>
+              <a:t>：</a:t>
+            </a:r>
+            <a:r>
+              <a:rPr lang="en-US" altLang="zh-CN" sz="1400" b="1" dirty="0" err="1" smtClean="0"/>
+              <a:t>true:CCW,false:CW</a:t>
+            </a:r>
+            <a:r>
+              <a:rPr lang="zh-CN" altLang="en-US" sz="1400" b="1" dirty="0" smtClean="0"/>
+              <a:t>，默认</a:t>
+            </a:r>
+            <a:r>
+              <a:rPr lang="en-US" altLang="zh-CN" sz="1400" b="1" dirty="0" smtClean="0"/>
+              <a:t>CCW</a:t>
+            </a:r>
+            <a:r>
+              <a:rPr lang="zh-CN" altLang="en-US" sz="1400" b="1" dirty="0" smtClean="0"/>
+              <a:t>，返回成功失败，需要在</a:t>
+            </a:r>
+            <a:r>
+              <a:rPr lang="en-US" altLang="zh-CN" sz="1400" b="1" dirty="0" err="1" smtClean="0"/>
+              <a:t>InitAPI</a:t>
+            </a:r>
+            <a:r>
+              <a:rPr lang="en-US" altLang="zh-CN" sz="1400" b="1" dirty="0" smtClean="0"/>
+              <a:t>()</a:t>
+            </a:r>
+            <a:r>
+              <a:rPr lang="zh-CN" altLang="en-US" sz="1400" b="1" dirty="0" smtClean="0"/>
+              <a:t>之后才能设置，</a:t>
+            </a:r>
+            <a:r>
+              <a:rPr lang="en-US" altLang="zh-CN" sz="1400" b="1" dirty="0" err="1" smtClean="0"/>
+              <a:t>EndAPI</a:t>
+            </a:r>
+            <a:r>
+              <a:rPr lang="en-US" altLang="zh-CN" sz="1400" b="1" dirty="0" smtClean="0"/>
+              <a:t>()</a:t>
+            </a:r>
+            <a:r>
+              <a:rPr lang="zh-CN" altLang="en-US" sz="1400" b="1" dirty="0" smtClean="0"/>
+              <a:t>之后自动设置为</a:t>
+            </a:r>
+            <a:r>
+              <a:rPr lang="en-US" altLang="zh-CN" sz="1400" b="1" dirty="0" smtClean="0"/>
+              <a:t>true</a:t>
+            </a:r>
+            <a:r>
+              <a:rPr lang="zh-CN" altLang="en-US" sz="1400" b="1" smtClean="0"/>
+              <a:t>；</a:t>
+            </a:r>
+            <a:endParaRPr lang="en-US" altLang="zh-CN" sz="1400" b="1" dirty="0" smtClean="0"/>
+          </a:p>
+          <a:p>
+            <a:pPr marL="285750" indent="-285750">
+              <a:buFont typeface="Arial" panose="020B0604020202020204" pitchFamily="34" charset="0"/>
+              <a:buChar char="•"/>
+            </a:pPr>
+            <a:r>
+              <a:rPr lang="en-US" altLang="zh-CN" sz="1400" b="1" dirty="0"/>
               <a:t>bool </a:t>
             </a:r>
             <a:r>
-              <a:rPr lang="en-US" altLang="zh-CN" sz="1600" b="1" dirty="0" err="1" smtClean="0"/>
+              <a:rPr lang="en-US" altLang="zh-CN" sz="1400" b="1" dirty="0" err="1" smtClean="0"/>
               <a:t>EndAPI</a:t>
             </a:r>
             <a:r>
-              <a:rPr lang="en-US" altLang="zh-CN" sz="1600" b="1" dirty="0" smtClean="0"/>
+              <a:rPr lang="en-US" altLang="zh-CN" sz="1400" b="1" dirty="0" smtClean="0"/>
               <a:t>()</a:t>
             </a:r>
             <a:r>
-              <a:rPr lang="zh-CN" altLang="en-US" sz="1600" b="1" dirty="0" smtClean="0"/>
+              <a:rPr lang="zh-CN" altLang="en-US" sz="1400" b="1" dirty="0" smtClean="0"/>
               <a:t>：</a:t>
             </a:r>
             <a:r>
-              <a:rPr lang="zh-CN" altLang="en-US" sz="1600" b="1" dirty="0"/>
+              <a:rPr lang="zh-CN" altLang="en-US" sz="1400" b="1" dirty="0"/>
               <a:t>结束</a:t>
             </a:r>
             <a:r>
-              <a:rPr lang="en-US" altLang="zh-CN" sz="1600" b="1" dirty="0"/>
+              <a:rPr lang="en-US" altLang="zh-CN" sz="1400" b="1" dirty="0"/>
               <a:t>API</a:t>
             </a:r>
             <a:r>
-              <a:rPr lang="zh-CN" altLang="en-US" sz="1600" b="1" dirty="0"/>
+              <a:rPr lang="zh-CN" altLang="en-US" sz="1400" b="1" dirty="0"/>
               <a:t>，释放</a:t>
             </a:r>
             <a:r>
-              <a:rPr lang="zh-CN" altLang="en-US" sz="1600" b="1" dirty="0" smtClean="0"/>
+              <a:rPr lang="zh-CN" altLang="en-US" sz="1400" b="1" dirty="0" smtClean="0"/>
               <a:t>内存，程序退出前请务必使用，避免内存泄漏！</a:t>
             </a:r>
-            <a:endParaRPr lang="en-US" altLang="zh-CN" sz="1600" b="1" dirty="0"/>
+            <a:endParaRPr lang="en-US" altLang="zh-CN" sz="1400" b="1" dirty="0"/>
           </a:p>
         </p:txBody>
       </p:sp>
@@ -12782,7 +12856,7 @@
                   <a:schemeClr val="bg1"/>
                 </a:solidFill>
               </a:rPr>
-              <a:t>4/6/2020</a:t>
+              <a:t>4/9/2020</a:t>
             </a:fld>
             <a:endParaRPr lang="de-DE" dirty="0">
               <a:solidFill>
@@ -13254,7 +13328,7 @@
                   <a:schemeClr val="bg1"/>
                 </a:solidFill>
               </a:rPr>
-              <a:t>4/6/2020</a:t>
+              <a:t>4/9/2020</a:t>
             </a:fld>
             <a:endParaRPr lang="de-DE" dirty="0">
               <a:solidFill>
@@ -13341,7 +13415,7 @@
         <p:spPr>
           <a:xfrm>
             <a:off x="107504" y="514876"/>
-            <a:ext cx="8424936" cy="4339650"/>
+            <a:ext cx="8424936" cy="4585871"/>
           </a:xfrm>
           <a:prstGeom prst="rect">
             <a:avLst/>
@@ -13497,6 +13571,33 @@
             <a:r>
               <a:rPr lang="zh-CN" altLang="en-US" sz="1600" b="1" dirty="0" smtClean="0"/>
               <a:t>。</a:t>
+            </a:r>
+            <a:endParaRPr lang="en-US" altLang="zh-CN" sz="1600" b="1" dirty="0" smtClean="0"/>
+          </a:p>
+          <a:p>
+            <a:r>
+              <a:rPr lang="en-US" altLang="zh-CN" sz="1600" b="1" dirty="0"/>
+              <a:t> </a:t>
+            </a:r>
+            <a:r>
+              <a:rPr lang="en-US" altLang="zh-CN" sz="1600" b="1" dirty="0" smtClean="0"/>
+              <a:t>        </a:t>
+            </a:r>
+            <a:r>
+              <a:rPr lang="en-US" altLang="zh-CN" sz="1600" b="1" dirty="0" err="1" smtClean="0"/>
+              <a:t>SetCW_CCW</a:t>
+            </a:r>
+            <a:r>
+              <a:rPr lang="en-US" altLang="zh-CN" sz="1600" b="1" dirty="0" smtClean="0"/>
+              <a:t>(false);//</a:t>
+            </a:r>
+            <a:r>
+              <a:rPr lang="zh-CN" altLang="en-US" sz="1600" b="1" dirty="0" smtClean="0"/>
+              <a:t>设置为</a:t>
+            </a:r>
+            <a:r>
+              <a:rPr lang="en-US" altLang="zh-CN" sz="1600" b="1" dirty="0" smtClean="0"/>
+              <a:t>CW</a:t>
             </a:r>
             <a:endParaRPr lang="en-US" altLang="zh-CN" sz="1600" b="1" dirty="0" smtClean="0"/>
           </a:p>
@@ -13804,7 +13905,7 @@
                   <a:schemeClr val="bg1"/>
                 </a:solidFill>
               </a:rPr>
-              <a:t>4/6/2020</a:t>
+              <a:t>4/9/2020</a:t>
             </a:fld>
             <a:endParaRPr lang="de-DE" dirty="0">
               <a:solidFill>

</xml_diff>